<commit_message>
add state progress in minicolumn
</commit_message>
<xml_diff>
--- a/doc/rules/HTM Neuron Rules.pptx
+++ b/doc/rules/HTM Neuron Rules.pptx
@@ -5,10 +5,11 @@
     <p:sldMasterId id="2147483648" r:id="rId1"/>
   </p:sldMasterIdLst>
   <p:notesMasterIdLst>
-    <p:notesMasterId r:id="rId3"/>
+    <p:notesMasterId r:id="rId4"/>
   </p:notesMasterIdLst>
   <p:sldIdLst>
     <p:sldId id="256" r:id="rId2"/>
+    <p:sldId id="257" r:id="rId3"/>
   </p:sldIdLst>
   <p:sldSz cx="12192000" cy="6858000"/>
   <p:notesSz cx="6858000" cy="9144000"/>
@@ -3905,6 +3906,101 @@
     <p:extLst>
       <p:ext uri="{BB962C8B-B14F-4D97-AF65-F5344CB8AC3E}">
         <p14:creationId xmlns:p14="http://schemas.microsoft.com/office/powerpoint/2010/main" val="3292781836"/>
+      </p:ext>
+    </p:extLst>
+  </p:cSld>
+  <p:clrMapOvr>
+    <a:masterClrMapping/>
+  </p:clrMapOvr>
+</p:sld>
+</file>
+
+<file path=ppt/slides/slide2.xml><?xml version="1.0" encoding="utf-8"?>
+<p:sld xmlns:a="http://schemas.openxmlformats.org/drawingml/2006/main" xmlns:r="http://schemas.openxmlformats.org/officeDocument/2006/relationships" xmlns:p="http://schemas.openxmlformats.org/presentationml/2006/main">
+  <p:cSld>
+    <p:spTree>
+      <p:nvGrpSpPr>
+        <p:cNvPr id="1" name=""/>
+        <p:cNvGrpSpPr/>
+        <p:nvPr/>
+      </p:nvGrpSpPr>
+      <p:grpSpPr>
+        <a:xfrm>
+          <a:off x="0" y="0"/>
+          <a:ext cx="0" cy="0"/>
+          <a:chOff x="0" y="0"/>
+          <a:chExt cx="0" cy="0"/>
+        </a:xfrm>
+      </p:grpSpPr>
+      <p:pic>
+        <p:nvPicPr>
+          <p:cNvPr id="2" name="Grafik 1">
+            <a:extLst>
+              <a:ext uri="{FF2B5EF4-FFF2-40B4-BE49-F238E27FC236}">
+                <a16:creationId xmlns:a16="http://schemas.microsoft.com/office/drawing/2014/main" id="{6FFBAD5B-CD64-5E04-7E8E-C280CF15898F}"/>
+              </a:ext>
+            </a:extLst>
+          </p:cNvPr>
+          <p:cNvPicPr>
+            <a:picLocks noChangeAspect="1"/>
+          </p:cNvPicPr>
+          <p:nvPr/>
+        </p:nvPicPr>
+        <p:blipFill>
+          <a:blip r:embed="rId2"/>
+          <a:stretch>
+            <a:fillRect/>
+          </a:stretch>
+        </p:blipFill>
+        <p:spPr>
+          <a:xfrm>
+            <a:off x="852829" y="1019669"/>
+            <a:ext cx="10486342" cy="5302753"/>
+          </a:xfrm>
+          <a:prstGeom prst="rect">
+            <a:avLst/>
+          </a:prstGeom>
+        </p:spPr>
+      </p:pic>
+      <p:sp>
+        <p:nvSpPr>
+          <p:cNvPr id="3" name="Textfeld 2">
+            <a:extLst>
+              <a:ext uri="{FF2B5EF4-FFF2-40B4-BE49-F238E27FC236}">
+                <a16:creationId xmlns:a16="http://schemas.microsoft.com/office/drawing/2014/main" id="{5BD70CB8-FBBB-BE70-01B9-6F70A53A6BDA}"/>
+              </a:ext>
+            </a:extLst>
+          </p:cNvPr>
+          <p:cNvSpPr txBox="1"/>
+          <p:nvPr/>
+        </p:nvSpPr>
+        <p:spPr>
+          <a:xfrm>
+            <a:off x="852829" y="373338"/>
+            <a:ext cx="5966505" cy="646331"/>
+          </a:xfrm>
+          <a:prstGeom prst="rect">
+            <a:avLst/>
+          </a:prstGeom>
+          <a:noFill/>
+        </p:spPr>
+        <p:txBody>
+          <a:bodyPr wrap="none" rtlCol="0">
+            <a:spAutoFit/>
+          </a:bodyPr>
+          <a:lstStyle/>
+          <a:p>
+            <a:r>
+              <a:rPr lang="de-DE" sz="3600" dirty="0"/>
+              <a:t>State Progress in a Minicolumn</a:t>
+            </a:r>
+          </a:p>
+        </p:txBody>
+      </p:sp>
+    </p:spTree>
+    <p:extLst>
+      <p:ext uri="{BB962C8B-B14F-4D97-AF65-F5344CB8AC3E}">
+        <p14:creationId xmlns:p14="http://schemas.microsoft.com/office/powerpoint/2010/main" val="3558441958"/>
       </p:ext>
     </p:extLst>
   </p:cSld>

</xml_diff>

<commit_message>
return a copy of c in update()
</commit_message>
<xml_diff>
--- a/doc/rules/HTM Neuron Rules.pptx
+++ b/doc/rules/HTM Neuron Rules.pptx
@@ -464,6 +464,90 @@
     </a:lvl9pPr>
   </p:notesStyle>
 </p:notesMaster>
+</file>
+
+<file path=ppt/notesSlides/notesSlide1.xml><?xml version="1.0" encoding="utf-8"?>
+<p:notes xmlns:a="http://schemas.openxmlformats.org/drawingml/2006/main" xmlns:r="http://schemas.openxmlformats.org/officeDocument/2006/relationships" xmlns:p="http://schemas.openxmlformats.org/presentationml/2006/main">
+  <p:cSld>
+    <p:spTree>
+      <p:nvGrpSpPr>
+        <p:cNvPr id="1" name=""/>
+        <p:cNvGrpSpPr/>
+        <p:nvPr/>
+      </p:nvGrpSpPr>
+      <p:grpSpPr>
+        <a:xfrm>
+          <a:off x="0" y="0"/>
+          <a:ext cx="0" cy="0"/>
+          <a:chOff x="0" y="0"/>
+          <a:chExt cx="0" cy="0"/>
+        </a:xfrm>
+      </p:grpSpPr>
+      <p:sp>
+        <p:nvSpPr>
+          <p:cNvPr id="2" name="Folienbildplatzhalter 1"/>
+          <p:cNvSpPr>
+            <a:spLocks noGrp="1" noRot="1" noChangeAspect="1"/>
+          </p:cNvSpPr>
+          <p:nvPr>
+            <p:ph type="sldImg"/>
+          </p:nvPr>
+        </p:nvSpPr>
+        <p:spPr/>
+      </p:sp>
+      <p:sp>
+        <p:nvSpPr>
+          <p:cNvPr id="3" name="Notizenplatzhalter 2"/>
+          <p:cNvSpPr>
+            <a:spLocks noGrp="1"/>
+          </p:cNvSpPr>
+          <p:nvPr>
+            <p:ph type="body" idx="1"/>
+          </p:nvPr>
+        </p:nvSpPr>
+        <p:spPr/>
+        <p:txBody>
+          <a:bodyPr/>
+          <a:lstStyle/>
+          <a:p>
+            <a:endParaRPr lang="de-DE" dirty="0"/>
+          </a:p>
+        </p:txBody>
+      </p:sp>
+      <p:sp>
+        <p:nvSpPr>
+          <p:cNvPr id="4" name="Foliennummernplatzhalter 3"/>
+          <p:cNvSpPr>
+            <a:spLocks noGrp="1"/>
+          </p:cNvSpPr>
+          <p:nvPr>
+            <p:ph type="sldNum" sz="quarter" idx="5"/>
+          </p:nvPr>
+        </p:nvSpPr>
+        <p:spPr/>
+        <p:txBody>
+          <a:bodyPr/>
+          <a:lstStyle/>
+          <a:p>
+            <a:fld id="{C92A1811-5870-B04B-BFAC-7255E544D666}" type="slidenum">
+              <a:rPr lang="en-US" smtClean="0"/>
+              <a:t>2</a:t>
+            </a:fld>
+            <a:endParaRPr lang="en-US"/>
+          </a:p>
+        </p:txBody>
+      </p:sp>
+    </p:spTree>
+    <p:extLst>
+      <p:ext uri="{BB962C8B-B14F-4D97-AF65-F5344CB8AC3E}">
+        <p14:creationId xmlns:p14="http://schemas.microsoft.com/office/powerpoint/2010/main" val="741896272"/>
+      </p:ext>
+    </p:extLst>
+  </p:cSld>
+  <p:clrMapOvr>
+    <a:masterClrMapping/>
+  </p:clrMapOvr>
+</p:notes>
 </file>
 
 <file path=ppt/slideLayouts/slideLayout1.xml><?xml version="1.0" encoding="utf-8"?>
@@ -3703,10 +3787,10 @@
       </p:grpSpPr>
       <p:grpSp>
         <p:nvGrpSpPr>
-          <p:cNvPr id="8" name="Gruppieren 7">
-            <a:extLst>
-              <a:ext uri="{FF2B5EF4-FFF2-40B4-BE49-F238E27FC236}">
-                <a16:creationId xmlns:a16="http://schemas.microsoft.com/office/drawing/2014/main" id="{DC921938-7AA2-73CE-EA3D-659685DA2F7B}"/>
+          <p:cNvPr id="36" name="Gruppieren 35">
+            <a:extLst>
+              <a:ext uri="{FF2B5EF4-FFF2-40B4-BE49-F238E27FC236}">
+                <a16:creationId xmlns:a16="http://schemas.microsoft.com/office/drawing/2014/main" id="{A67F2A8E-EA05-A91E-AC38-C88D24FD25B4}"/>
               </a:ext>
             </a:extLst>
           </p:cNvPr>
@@ -3715,18 +3799,18 @@
         </p:nvGrpSpPr>
         <p:grpSpPr>
           <a:xfrm>
-            <a:off x="544942" y="461730"/>
-            <a:ext cx="11127521" cy="5947602"/>
-            <a:chOff x="544942" y="461730"/>
-            <a:chExt cx="11127521" cy="5947602"/>
+            <a:off x="544942" y="491961"/>
+            <a:ext cx="11089377" cy="5897024"/>
+            <a:chOff x="544942" y="491961"/>
+            <a:chExt cx="11089377" cy="5897024"/>
           </a:xfrm>
         </p:grpSpPr>
         <p:pic>
           <p:nvPicPr>
-            <p:cNvPr id="4" name="Grafik 3">
+            <p:cNvPr id="17" name="Grafik 16">
               <a:extLst>
                 <a:ext uri="{FF2B5EF4-FFF2-40B4-BE49-F238E27FC236}">
-                  <a16:creationId xmlns:a16="http://schemas.microsoft.com/office/drawing/2014/main" id="{96F16604-FC59-CEA5-63B2-8DB803242D65}"/>
+                  <a16:creationId xmlns:a16="http://schemas.microsoft.com/office/drawing/2014/main" id="{15E68EAA-36A2-B2A4-F435-CF4CB3546896}"/>
                 </a:ext>
               </a:extLst>
             </p:cNvPr>
@@ -3743,8 +3827,8 @@
           </p:blipFill>
           <p:spPr>
             <a:xfrm>
-              <a:off x="544942" y="461731"/>
-              <a:ext cx="3536842" cy="2865673"/>
+              <a:off x="4380626" y="491961"/>
+              <a:ext cx="3491259" cy="2805403"/>
             </a:xfrm>
             <a:prstGeom prst="rect">
               <a:avLst/>
@@ -3753,10 +3837,10 @@
         </p:pic>
         <p:pic>
           <p:nvPicPr>
-            <p:cNvPr id="6" name="Grafik 5">
+            <p:cNvPr id="21" name="Grafik 20">
               <a:extLst>
                 <a:ext uri="{FF2B5EF4-FFF2-40B4-BE49-F238E27FC236}">
-                  <a16:creationId xmlns:a16="http://schemas.microsoft.com/office/drawing/2014/main" id="{E4DC15CB-4D71-BB11-D6CE-C68D896BEB8D}"/>
+                  <a16:creationId xmlns:a16="http://schemas.microsoft.com/office/drawing/2014/main" id="{A768D9F5-B96C-73A5-9B88-89F809B6D379}"/>
                 </a:ext>
               </a:extLst>
             </p:cNvPr>
@@ -3773,8 +3857,8 @@
           </p:blipFill>
           <p:spPr>
             <a:xfrm>
-              <a:off x="8087258" y="461731"/>
-              <a:ext cx="3585205" cy="2852909"/>
+              <a:off x="544942" y="3577044"/>
+              <a:ext cx="3511705" cy="2809364"/>
             </a:xfrm>
             <a:prstGeom prst="rect">
               <a:avLst/>
@@ -3783,10 +3867,10 @@
         </p:pic>
         <p:pic>
           <p:nvPicPr>
-            <p:cNvPr id="9" name="Grafik 8">
+            <p:cNvPr id="27" name="Grafik 26">
               <a:extLst>
                 <a:ext uri="{FF2B5EF4-FFF2-40B4-BE49-F238E27FC236}">
-                  <a16:creationId xmlns:a16="http://schemas.microsoft.com/office/drawing/2014/main" id="{96E4E5C7-6C0B-AF57-B6B5-D895E53E4485}"/>
+                  <a16:creationId xmlns:a16="http://schemas.microsoft.com/office/drawing/2014/main" id="{F0930097-4519-6D6C-30FA-37E3E2D5F095}"/>
                 </a:ext>
               </a:extLst>
             </p:cNvPr>
@@ -3803,8 +3887,8 @@
           </p:blipFill>
           <p:spPr>
             <a:xfrm>
-              <a:off x="4344163" y="3578627"/>
-              <a:ext cx="3527723" cy="2807782"/>
+              <a:off x="8097898" y="3585512"/>
+              <a:ext cx="3522858" cy="2803473"/>
             </a:xfrm>
             <a:prstGeom prst="rect">
               <a:avLst/>
@@ -3813,10 +3897,10 @@
         </p:pic>
         <p:pic>
           <p:nvPicPr>
-            <p:cNvPr id="10" name="Grafik 9">
+            <p:cNvPr id="30" name="Grafik 29">
               <a:extLst>
                 <a:ext uri="{FF2B5EF4-FFF2-40B4-BE49-F238E27FC236}">
-                  <a16:creationId xmlns:a16="http://schemas.microsoft.com/office/drawing/2014/main" id="{A37055BF-612A-3A82-DFA3-B4B6606D462A}"/>
+                  <a16:creationId xmlns:a16="http://schemas.microsoft.com/office/drawing/2014/main" id="{A7480FA8-0026-8097-429A-87C9E50F3E50}"/>
                 </a:ext>
               </a:extLst>
             </p:cNvPr>
@@ -3833,8 +3917,8 @@
           </p:blipFill>
           <p:spPr>
             <a:xfrm>
-              <a:off x="8097898" y="3578626"/>
-              <a:ext cx="3536841" cy="2807782"/>
+              <a:off x="8135355" y="506747"/>
+              <a:ext cx="3498964" cy="2803473"/>
             </a:xfrm>
             <a:prstGeom prst="rect">
               <a:avLst/>
@@ -3843,10 +3927,10 @@
         </p:pic>
         <p:pic>
           <p:nvPicPr>
-            <p:cNvPr id="2" name="Grafik 1">
+            <p:cNvPr id="33" name="Grafik 32">
               <a:extLst>
                 <a:ext uri="{FF2B5EF4-FFF2-40B4-BE49-F238E27FC236}">
-                  <a16:creationId xmlns:a16="http://schemas.microsoft.com/office/drawing/2014/main" id="{44242D54-A8FA-D76A-293A-ACF8BB9E8878}"/>
+                  <a16:creationId xmlns:a16="http://schemas.microsoft.com/office/drawing/2014/main" id="{A320A185-26FB-4710-47DF-55E4AF56665C}"/>
                 </a:ext>
               </a:extLst>
             </p:cNvPr>
@@ -3863,8 +3947,8 @@
           </p:blipFill>
           <p:spPr>
             <a:xfrm>
-              <a:off x="4344163" y="461730"/>
-              <a:ext cx="3527723" cy="2865674"/>
+              <a:off x="4380626" y="3586277"/>
+              <a:ext cx="3491258" cy="2800131"/>
             </a:xfrm>
             <a:prstGeom prst="rect">
               <a:avLst/>
@@ -3873,10 +3957,10 @@
         </p:pic>
         <p:pic>
           <p:nvPicPr>
-            <p:cNvPr id="3" name="Grafik 2">
+            <p:cNvPr id="35" name="Grafik 34">
               <a:extLst>
                 <a:ext uri="{FF2B5EF4-FFF2-40B4-BE49-F238E27FC236}">
-                  <a16:creationId xmlns:a16="http://schemas.microsoft.com/office/drawing/2014/main" id="{5FC0F2F4-4FB7-DA67-18F3-6506C7D1AE09}"/>
+                  <a16:creationId xmlns:a16="http://schemas.microsoft.com/office/drawing/2014/main" id="{5E60C6A1-14EA-2237-5C83-2C22F4286740}"/>
                 </a:ext>
               </a:extLst>
             </p:cNvPr>
@@ -3893,8 +3977,8 @@
           </p:blipFill>
           <p:spPr>
             <a:xfrm>
-              <a:off x="544942" y="3578626"/>
-              <a:ext cx="3527723" cy="2830706"/>
+              <a:off x="571244" y="506747"/>
+              <a:ext cx="3485402" cy="2799749"/>
             </a:xfrm>
             <a:prstGeom prst="rect">
               <a:avLst/>
@@ -3932,51 +4016,21 @@
           <a:chExt cx="0" cy="0"/>
         </a:xfrm>
       </p:grpSpPr>
-      <p:pic>
-        <p:nvPicPr>
-          <p:cNvPr id="2" name="Grafik 1">
-            <a:extLst>
-              <a:ext uri="{FF2B5EF4-FFF2-40B4-BE49-F238E27FC236}">
-                <a16:creationId xmlns:a16="http://schemas.microsoft.com/office/drawing/2014/main" id="{6FFBAD5B-CD64-5E04-7E8E-C280CF15898F}"/>
-              </a:ext>
-            </a:extLst>
-          </p:cNvPr>
-          <p:cNvPicPr>
-            <a:picLocks noChangeAspect="1"/>
-          </p:cNvPicPr>
+      <p:sp>
+        <p:nvSpPr>
+          <p:cNvPr id="3" name="Textfeld 2">
+            <a:extLst>
+              <a:ext uri="{FF2B5EF4-FFF2-40B4-BE49-F238E27FC236}">
+                <a16:creationId xmlns:a16="http://schemas.microsoft.com/office/drawing/2014/main" id="{5BD70CB8-FBBB-BE70-01B9-6F70A53A6BDA}"/>
+              </a:ext>
+            </a:extLst>
+          </p:cNvPr>
+          <p:cNvSpPr txBox="1"/>
           <p:nvPr/>
-        </p:nvPicPr>
-        <p:blipFill>
-          <a:blip r:embed="rId2"/>
-          <a:stretch>
-            <a:fillRect/>
-          </a:stretch>
-        </p:blipFill>
+        </p:nvSpPr>
         <p:spPr>
           <a:xfrm>
-            <a:off x="852829" y="1019669"/>
-            <a:ext cx="10486342" cy="5302753"/>
-          </a:xfrm>
-          <a:prstGeom prst="rect">
-            <a:avLst/>
-          </a:prstGeom>
-        </p:spPr>
-      </p:pic>
-      <p:sp>
-        <p:nvSpPr>
-          <p:cNvPr id="3" name="Textfeld 2">
-            <a:extLst>
-              <a:ext uri="{FF2B5EF4-FFF2-40B4-BE49-F238E27FC236}">
-                <a16:creationId xmlns:a16="http://schemas.microsoft.com/office/drawing/2014/main" id="{5BD70CB8-FBBB-BE70-01B9-6F70A53A6BDA}"/>
-              </a:ext>
-            </a:extLst>
-          </p:cNvPr>
-          <p:cNvSpPr txBox="1"/>
-          <p:nvPr/>
-        </p:nvSpPr>
-        <p:spPr>
-          <a:xfrm>
-            <a:off x="852829" y="373338"/>
+            <a:off x="1042012" y="373338"/>
             <a:ext cx="5966505" cy="646331"/>
           </a:xfrm>
           <a:prstGeom prst="rect">
@@ -3997,6 +4051,36 @@
           </a:p>
         </p:txBody>
       </p:sp>
+      <p:pic>
+        <p:nvPicPr>
+          <p:cNvPr id="5" name="Grafik 4">
+            <a:extLst>
+              <a:ext uri="{FF2B5EF4-FFF2-40B4-BE49-F238E27FC236}">
+                <a16:creationId xmlns:a16="http://schemas.microsoft.com/office/drawing/2014/main" id="{95F76E89-54C6-4A60-4E04-D9EB13DCEB9A}"/>
+              </a:ext>
+            </a:extLst>
+          </p:cNvPr>
+          <p:cNvPicPr>
+            <a:picLocks noChangeAspect="1"/>
+          </p:cNvPicPr>
+          <p:nvPr/>
+        </p:nvPicPr>
+        <p:blipFill>
+          <a:blip r:embed="rId3"/>
+          <a:stretch>
+            <a:fillRect/>
+          </a:stretch>
+        </p:blipFill>
+        <p:spPr>
+          <a:xfrm>
+            <a:off x="1131176" y="1120885"/>
+            <a:ext cx="9957238" cy="5048494"/>
+          </a:xfrm>
+          <a:prstGeom prst="rect">
+            <a:avLst/>
+          </a:prstGeom>
+        </p:spPr>
+      </p:pic>
     </p:spTree>
     <p:extLst>
       <p:ext uri="{BB962C8B-B14F-4D97-AF65-F5344CB8AC3E}">

</xml_diff>

<commit_message>
update PPT for 4 phases
</commit_message>
<xml_diff>
--- a/doc/rules/HTM Neuron Rules.pptx
+++ b/doc/rules/HTM Neuron Rules.pptx
@@ -5,14 +5,12 @@
     <p:sldMasterId id="2147483648" r:id="rId1"/>
   </p:sldMasterIdLst>
   <p:notesMasterIdLst>
-    <p:notesMasterId r:id="rId7"/>
+    <p:notesMasterId r:id="rId5"/>
   </p:notesMasterIdLst>
   <p:sldIdLst>
     <p:sldId id="256" r:id="rId2"/>
     <p:sldId id="258" r:id="rId3"/>
     <p:sldId id="257" r:id="rId4"/>
-    <p:sldId id="260" r:id="rId5"/>
-    <p:sldId id="259" r:id="rId6"/>
   </p:sldIdLst>
   <p:sldSz cx="12192000" cy="6858000"/>
   <p:notesSz cx="6858000" cy="9144000"/>
@@ -544,174 +542,6 @@
     <p:extLst>
       <p:ext uri="{BB962C8B-B14F-4D97-AF65-F5344CB8AC3E}">
         <p14:creationId xmlns:p14="http://schemas.microsoft.com/office/powerpoint/2010/main" val="741896272"/>
-      </p:ext>
-    </p:extLst>
-  </p:cSld>
-  <p:clrMapOvr>
-    <a:masterClrMapping/>
-  </p:clrMapOvr>
-</p:notes>
-</file>
-
-<file path=ppt/notesSlides/notesSlide2.xml><?xml version="1.0" encoding="utf-8"?>
-<p:notes xmlns:a="http://schemas.openxmlformats.org/drawingml/2006/main" xmlns:r="http://schemas.openxmlformats.org/officeDocument/2006/relationships" xmlns:p="http://schemas.openxmlformats.org/presentationml/2006/main">
-  <p:cSld>
-    <p:spTree>
-      <p:nvGrpSpPr>
-        <p:cNvPr id="1" name=""/>
-        <p:cNvGrpSpPr/>
-        <p:nvPr/>
-      </p:nvGrpSpPr>
-      <p:grpSpPr>
-        <a:xfrm>
-          <a:off x="0" y="0"/>
-          <a:ext cx="0" cy="0"/>
-          <a:chOff x="0" y="0"/>
-          <a:chExt cx="0" cy="0"/>
-        </a:xfrm>
-      </p:grpSpPr>
-      <p:sp>
-        <p:nvSpPr>
-          <p:cNvPr id="2" name="Folienbildplatzhalter 1"/>
-          <p:cNvSpPr>
-            <a:spLocks noGrp="1" noRot="1" noChangeAspect="1"/>
-          </p:cNvSpPr>
-          <p:nvPr>
-            <p:ph type="sldImg"/>
-          </p:nvPr>
-        </p:nvSpPr>
-        <p:spPr/>
-      </p:sp>
-      <p:sp>
-        <p:nvSpPr>
-          <p:cNvPr id="3" name="Notizenplatzhalter 2"/>
-          <p:cNvSpPr>
-            <a:spLocks noGrp="1"/>
-          </p:cNvSpPr>
-          <p:nvPr>
-            <p:ph type="body" idx="1"/>
-          </p:nvPr>
-        </p:nvSpPr>
-        <p:spPr/>
-        <p:txBody>
-          <a:bodyPr/>
-          <a:lstStyle/>
-          <a:p>
-            <a:endParaRPr lang="de-DE" dirty="0"/>
-          </a:p>
-        </p:txBody>
-      </p:sp>
-      <p:sp>
-        <p:nvSpPr>
-          <p:cNvPr id="4" name="Foliennummernplatzhalter 3"/>
-          <p:cNvSpPr>
-            <a:spLocks noGrp="1"/>
-          </p:cNvSpPr>
-          <p:nvPr>
-            <p:ph type="sldNum" sz="quarter" idx="5"/>
-          </p:nvPr>
-        </p:nvSpPr>
-        <p:spPr/>
-        <p:txBody>
-          <a:bodyPr/>
-          <a:lstStyle/>
-          <a:p>
-            <a:fld id="{C92A1811-5870-B04B-BFAC-7255E544D666}" type="slidenum">
-              <a:rPr lang="en-US" smtClean="0"/>
-              <a:t>4</a:t>
-            </a:fld>
-            <a:endParaRPr lang="en-US"/>
-          </a:p>
-        </p:txBody>
-      </p:sp>
-    </p:spTree>
-    <p:extLst>
-      <p:ext uri="{BB962C8B-B14F-4D97-AF65-F5344CB8AC3E}">
-        <p14:creationId xmlns:p14="http://schemas.microsoft.com/office/powerpoint/2010/main" val="1566269693"/>
-      </p:ext>
-    </p:extLst>
-  </p:cSld>
-  <p:clrMapOvr>
-    <a:masterClrMapping/>
-  </p:clrMapOvr>
-</p:notes>
-</file>
-
-<file path=ppt/notesSlides/notesSlide3.xml><?xml version="1.0" encoding="utf-8"?>
-<p:notes xmlns:a="http://schemas.openxmlformats.org/drawingml/2006/main" xmlns:r="http://schemas.openxmlformats.org/officeDocument/2006/relationships" xmlns:p="http://schemas.openxmlformats.org/presentationml/2006/main">
-  <p:cSld>
-    <p:spTree>
-      <p:nvGrpSpPr>
-        <p:cNvPr id="1" name=""/>
-        <p:cNvGrpSpPr/>
-        <p:nvPr/>
-      </p:nvGrpSpPr>
-      <p:grpSpPr>
-        <a:xfrm>
-          <a:off x="0" y="0"/>
-          <a:ext cx="0" cy="0"/>
-          <a:chOff x="0" y="0"/>
-          <a:chExt cx="0" cy="0"/>
-        </a:xfrm>
-      </p:grpSpPr>
-      <p:sp>
-        <p:nvSpPr>
-          <p:cNvPr id="2" name="Folienbildplatzhalter 1"/>
-          <p:cNvSpPr>
-            <a:spLocks noGrp="1" noRot="1" noChangeAspect="1"/>
-          </p:cNvSpPr>
-          <p:nvPr>
-            <p:ph type="sldImg"/>
-          </p:nvPr>
-        </p:nvSpPr>
-        <p:spPr/>
-      </p:sp>
-      <p:sp>
-        <p:nvSpPr>
-          <p:cNvPr id="3" name="Notizenplatzhalter 2"/>
-          <p:cNvSpPr>
-            <a:spLocks noGrp="1"/>
-          </p:cNvSpPr>
-          <p:nvPr>
-            <p:ph type="body" idx="1"/>
-          </p:nvPr>
-        </p:nvSpPr>
-        <p:spPr/>
-        <p:txBody>
-          <a:bodyPr/>
-          <a:lstStyle/>
-          <a:p>
-            <a:endParaRPr lang="de-DE" dirty="0"/>
-          </a:p>
-        </p:txBody>
-      </p:sp>
-      <p:sp>
-        <p:nvSpPr>
-          <p:cNvPr id="4" name="Foliennummernplatzhalter 3"/>
-          <p:cNvSpPr>
-            <a:spLocks noGrp="1"/>
-          </p:cNvSpPr>
-          <p:nvPr>
-            <p:ph type="sldNum" sz="quarter" idx="5"/>
-          </p:nvPr>
-        </p:nvSpPr>
-        <p:spPr/>
-        <p:txBody>
-          <a:bodyPr/>
-          <a:lstStyle/>
-          <a:p>
-            <a:fld id="{C92A1811-5870-B04B-BFAC-7255E544D666}" type="slidenum">
-              <a:rPr lang="en-US" smtClean="0"/>
-              <a:t>5</a:t>
-            </a:fld>
-            <a:endParaRPr lang="en-US"/>
-          </a:p>
-        </p:txBody>
-      </p:sp>
-    </p:spTree>
-    <p:extLst>
-      <p:ext uri="{BB962C8B-B14F-4D97-AF65-F5344CB8AC3E}">
-        <p14:creationId xmlns:p14="http://schemas.microsoft.com/office/powerpoint/2010/main" val="289817870"/>
       </p:ext>
     </p:extLst>
   </p:cSld>
@@ -4462,7 +4292,7 @@
         </p:nvSpPr>
         <p:spPr>
           <a:xfrm>
-            <a:off x="1042012" y="373338"/>
+            <a:off x="851009" y="383848"/>
             <a:ext cx="5966505" cy="646331"/>
           </a:xfrm>
           <a:prstGeom prst="rect">
@@ -4478,25 +4308,17 @@
           <a:p>
             <a:r>
               <a:rPr lang="de-DE" sz="3600" dirty="0"/>
-              <a:t>State Progress </a:t>
-            </a:r>
-            <a:r>
-              <a:rPr lang="de-DE" sz="3600" dirty="0" err="1"/>
-              <a:t>of</a:t>
-            </a:r>
-            <a:r>
-              <a:rPr lang="de-DE" sz="3600" dirty="0"/>
-              <a:t> a Minicolumn</a:t>
+              <a:t>State Progress of a Minicolumn</a:t>
             </a:r>
           </a:p>
         </p:txBody>
       </p:sp>
       <p:pic>
         <p:nvPicPr>
-          <p:cNvPr id="5" name="Grafik 4">
-            <a:extLst>
-              <a:ext uri="{FF2B5EF4-FFF2-40B4-BE49-F238E27FC236}">
-                <a16:creationId xmlns:a16="http://schemas.microsoft.com/office/drawing/2014/main" id="{DA428E99-9EE5-1AC2-863A-F5ED30E3EFE5}"/>
+          <p:cNvPr id="2" name="Grafik 1">
+            <a:extLst>
+              <a:ext uri="{FF2B5EF4-FFF2-40B4-BE49-F238E27FC236}">
+                <a16:creationId xmlns:a16="http://schemas.microsoft.com/office/drawing/2014/main" id="{4CF2E008-D891-AD49-86FC-9CA8E2875D24}"/>
               </a:ext>
             </a:extLst>
           </p:cNvPr>
@@ -4513,8 +4335,8 @@
         </p:blipFill>
         <p:spPr>
           <a:xfrm>
-            <a:off x="1129663" y="1120883"/>
-            <a:ext cx="9932674" cy="5031684"/>
+            <a:off x="851009" y="1395743"/>
+            <a:ext cx="10604036" cy="4341373"/>
           </a:xfrm>
           <a:prstGeom prst="rect">
             <a:avLst/>
@@ -4525,212 +4347,6 @@
     <p:extLst>
       <p:ext uri="{BB962C8B-B14F-4D97-AF65-F5344CB8AC3E}">
         <p14:creationId xmlns:p14="http://schemas.microsoft.com/office/powerpoint/2010/main" val="3558441958"/>
-      </p:ext>
-    </p:extLst>
-  </p:cSld>
-  <p:clrMapOvr>
-    <a:masterClrMapping/>
-  </p:clrMapOvr>
-</p:sld>
-</file>
-
-<file path=ppt/slides/slide4.xml><?xml version="1.0" encoding="utf-8"?>
-<p:sld xmlns:a="http://schemas.openxmlformats.org/drawingml/2006/main" xmlns:r="http://schemas.openxmlformats.org/officeDocument/2006/relationships" xmlns:p="http://schemas.openxmlformats.org/presentationml/2006/main">
-  <p:cSld>
-    <p:spTree>
-      <p:nvGrpSpPr>
-        <p:cNvPr id="1" name=""/>
-        <p:cNvGrpSpPr/>
-        <p:nvPr/>
-      </p:nvGrpSpPr>
-      <p:grpSpPr>
-        <a:xfrm>
-          <a:off x="0" y="0"/>
-          <a:ext cx="0" cy="0"/>
-          <a:chOff x="0" y="0"/>
-          <a:chExt cx="0" cy="0"/>
-        </a:xfrm>
-      </p:grpSpPr>
-      <p:sp>
-        <p:nvSpPr>
-          <p:cNvPr id="3" name="Textfeld 2">
-            <a:extLst>
-              <a:ext uri="{FF2B5EF4-FFF2-40B4-BE49-F238E27FC236}">
-                <a16:creationId xmlns:a16="http://schemas.microsoft.com/office/drawing/2014/main" id="{5BD70CB8-FBBB-BE70-01B9-6F70A53A6BDA}"/>
-              </a:ext>
-            </a:extLst>
-          </p:cNvPr>
-          <p:cNvSpPr txBox="1"/>
-          <p:nvPr/>
-        </p:nvSpPr>
-        <p:spPr>
-          <a:xfrm>
-            <a:off x="1042012" y="373338"/>
-            <a:ext cx="5966505" cy="646331"/>
-          </a:xfrm>
-          <a:prstGeom prst="rect">
-            <a:avLst/>
-          </a:prstGeom>
-          <a:noFill/>
-        </p:spPr>
-        <p:txBody>
-          <a:bodyPr wrap="none" rtlCol="0">
-            <a:spAutoFit/>
-          </a:bodyPr>
-          <a:lstStyle/>
-          <a:p>
-            <a:r>
-              <a:rPr lang="de-DE" sz="3600" dirty="0"/>
-              <a:t>State Progress </a:t>
-            </a:r>
-            <a:r>
-              <a:rPr lang="de-DE" sz="3600" dirty="0" err="1"/>
-              <a:t>of</a:t>
-            </a:r>
-            <a:r>
-              <a:rPr lang="de-DE" sz="3600" dirty="0"/>
-              <a:t> a Minicolumn</a:t>
-            </a:r>
-          </a:p>
-        </p:txBody>
-      </p:sp>
-      <p:pic>
-        <p:nvPicPr>
-          <p:cNvPr id="5" name="Grafik 4">
-            <a:extLst>
-              <a:ext uri="{FF2B5EF4-FFF2-40B4-BE49-F238E27FC236}">
-                <a16:creationId xmlns:a16="http://schemas.microsoft.com/office/drawing/2014/main" id="{E611F65A-A00E-C6C0-5E59-85AF5074BFF0}"/>
-              </a:ext>
-            </a:extLst>
-          </p:cNvPr>
-          <p:cNvPicPr>
-            <a:picLocks noChangeAspect="1"/>
-          </p:cNvPicPr>
-          <p:nvPr/>
-        </p:nvPicPr>
-        <p:blipFill>
-          <a:blip r:embed="rId3"/>
-          <a:stretch>
-            <a:fillRect/>
-          </a:stretch>
-        </p:blipFill>
-        <p:spPr>
-          <a:xfrm>
-            <a:off x="1123314" y="1120883"/>
-            <a:ext cx="9944660" cy="5113775"/>
-          </a:xfrm>
-          <a:prstGeom prst="rect">
-            <a:avLst/>
-          </a:prstGeom>
-        </p:spPr>
-      </p:pic>
-    </p:spTree>
-    <p:extLst>
-      <p:ext uri="{BB962C8B-B14F-4D97-AF65-F5344CB8AC3E}">
-        <p14:creationId xmlns:p14="http://schemas.microsoft.com/office/powerpoint/2010/main" val="615173655"/>
-      </p:ext>
-    </p:extLst>
-  </p:cSld>
-  <p:clrMapOvr>
-    <a:masterClrMapping/>
-  </p:clrMapOvr>
-</p:sld>
-</file>
-
-<file path=ppt/slides/slide5.xml><?xml version="1.0" encoding="utf-8"?>
-<p:sld xmlns:a="http://schemas.openxmlformats.org/drawingml/2006/main" xmlns:r="http://schemas.openxmlformats.org/officeDocument/2006/relationships" xmlns:p="http://schemas.openxmlformats.org/presentationml/2006/main">
-  <p:cSld>
-    <p:spTree>
-      <p:nvGrpSpPr>
-        <p:cNvPr id="1" name=""/>
-        <p:cNvGrpSpPr/>
-        <p:nvPr/>
-      </p:nvGrpSpPr>
-      <p:grpSpPr>
-        <a:xfrm>
-          <a:off x="0" y="0"/>
-          <a:ext cx="0" cy="0"/>
-          <a:chOff x="0" y="0"/>
-          <a:chExt cx="0" cy="0"/>
-        </a:xfrm>
-      </p:grpSpPr>
-      <p:pic>
-        <p:nvPicPr>
-          <p:cNvPr id="7" name="Grafik 6">
-            <a:extLst>
-              <a:ext uri="{FF2B5EF4-FFF2-40B4-BE49-F238E27FC236}">
-                <a16:creationId xmlns:a16="http://schemas.microsoft.com/office/drawing/2014/main" id="{DDB1BDB2-040F-7910-F9F3-6E6E77ED6EAF}"/>
-              </a:ext>
-            </a:extLst>
-          </p:cNvPr>
-          <p:cNvPicPr>
-            <a:picLocks noChangeAspect="1"/>
-          </p:cNvPicPr>
-          <p:nvPr/>
-        </p:nvPicPr>
-        <p:blipFill>
-          <a:blip r:embed="rId3"/>
-          <a:stretch>
-            <a:fillRect/>
-          </a:stretch>
-        </p:blipFill>
-        <p:spPr>
-          <a:xfrm>
-            <a:off x="1123313" y="1120884"/>
-            <a:ext cx="9944661" cy="5048493"/>
-          </a:xfrm>
-          <a:prstGeom prst="rect">
-            <a:avLst/>
-          </a:prstGeom>
-        </p:spPr>
-      </p:pic>
-      <p:sp>
-        <p:nvSpPr>
-          <p:cNvPr id="3" name="Textfeld 2">
-            <a:extLst>
-              <a:ext uri="{FF2B5EF4-FFF2-40B4-BE49-F238E27FC236}">
-                <a16:creationId xmlns:a16="http://schemas.microsoft.com/office/drawing/2014/main" id="{5BD70CB8-FBBB-BE70-01B9-6F70A53A6BDA}"/>
-              </a:ext>
-            </a:extLst>
-          </p:cNvPr>
-          <p:cNvSpPr txBox="1"/>
-          <p:nvPr/>
-        </p:nvSpPr>
-        <p:spPr>
-          <a:xfrm>
-            <a:off x="1042012" y="373338"/>
-            <a:ext cx="5966505" cy="646331"/>
-          </a:xfrm>
-          <a:prstGeom prst="rect">
-            <a:avLst/>
-          </a:prstGeom>
-          <a:noFill/>
-        </p:spPr>
-        <p:txBody>
-          <a:bodyPr wrap="none" rtlCol="0">
-            <a:spAutoFit/>
-          </a:bodyPr>
-          <a:lstStyle/>
-          <a:p>
-            <a:r>
-              <a:rPr lang="de-DE" sz="3600" dirty="0"/>
-              <a:t>State Progress </a:t>
-            </a:r>
-            <a:r>
-              <a:rPr lang="de-DE" sz="3600"/>
-              <a:t>of </a:t>
-            </a:r>
-            <a:r>
-              <a:rPr lang="de-DE" sz="3600" dirty="0"/>
-              <a:t>a Minicolumn</a:t>
-            </a:r>
-          </a:p>
-        </p:txBody>
-      </p:sp>
-    </p:spTree>
-    <p:extLst>
-      <p:ext uri="{BB962C8B-B14F-4D97-AF65-F5344CB8AC3E}">
-        <p14:creationId xmlns:p14="http://schemas.microsoft.com/office/powerpoint/2010/main" val="4048435210"/>
       </p:ext>
     </p:extLst>
   </p:cSld>

</xml_diff>